<commit_message>
Changed presentation to beauty
</commit_message>
<xml_diff>
--- a/CourseProject/Presentation/U3DSpace.pptx
+++ b/CourseProject/Presentation/U3DSpace.pptx
@@ -3399,7 +3399,7 @@
         <p:spPr>
           <a:xfrm>
             <a:off x="179512" y="188640"/>
-            <a:ext cx="8784976" cy="369332"/>
+            <a:ext cx="8784976" cy="923330"/>
           </a:xfrm>
           <a:prstGeom prst="rect">
             <a:avLst/>
@@ -3414,12 +3414,26 @@
           <a:p>
             <a:pPr algn="ctr"/>
             <a:r>
-              <a:rPr lang="uk-UA" dirty="0" smtClean="0">
+              <a:rPr lang="uk-UA" b="1" dirty="0" smtClean="0">
                 <a:latin typeface="Segoe UI Light" pitchFamily="34" charset="0"/>
                 <a:cs typeface="Segoe UI Light" pitchFamily="34" charset="0"/>
               </a:rPr>
               <a:t>Постановка задачі</a:t>
             </a:r>
+          </a:p>
+          <a:p>
+            <a:pPr algn="ctr"/>
+            <a:endParaRPr lang="uk-UA" dirty="0">
+              <a:latin typeface="Segoe UI Light" pitchFamily="34" charset="0"/>
+              <a:cs typeface="Segoe UI Light" pitchFamily="34" charset="0"/>
+            </a:endParaRPr>
+          </a:p>
+          <a:p>
+            <a:pPr algn="ctr"/>
+            <a:endParaRPr lang="uk-UA" dirty="0" smtClean="0">
+              <a:latin typeface="Segoe UI Light" pitchFamily="34" charset="0"/>
+              <a:cs typeface="Segoe UI Light" pitchFamily="34" charset="0"/>
+            </a:endParaRPr>
           </a:p>
         </p:txBody>
       </p:sp>
@@ -3543,7 +3557,7 @@
         <p:spPr>
           <a:xfrm>
             <a:off x="179512" y="188640"/>
-            <a:ext cx="8784976" cy="369332"/>
+            <a:ext cx="8784976" cy="3693319"/>
           </a:xfrm>
           <a:prstGeom prst="rect">
             <a:avLst/>
@@ -3558,12 +3572,206 @@
           <a:p>
             <a:pPr algn="ctr"/>
             <a:r>
-              <a:rPr lang="uk-UA" dirty="0" smtClean="0">
+              <a:rPr lang="uk-UA" b="1" dirty="0" smtClean="0">
                 <a:latin typeface="Segoe UI Light" pitchFamily="34" charset="0"/>
                 <a:cs typeface="Segoe UI Light" pitchFamily="34" charset="0"/>
               </a:rPr>
               <a:t>Висновки</a:t>
             </a:r>
+            <a:endParaRPr lang="en-US" b="1" dirty="0" smtClean="0">
+              <a:latin typeface="Segoe UI Light" pitchFamily="34" charset="0"/>
+              <a:cs typeface="Segoe UI Light" pitchFamily="34" charset="0"/>
+            </a:endParaRPr>
+          </a:p>
+          <a:p>
+            <a:pPr algn="ctr"/>
+            <a:endParaRPr lang="en-US" dirty="0">
+              <a:latin typeface="Segoe UI Light" pitchFamily="34" charset="0"/>
+              <a:cs typeface="Segoe UI Light" pitchFamily="34" charset="0"/>
+            </a:endParaRPr>
+          </a:p>
+          <a:p>
+            <a:pPr algn="ctr"/>
+            <a:endParaRPr lang="en-US" dirty="0" smtClean="0">
+              <a:latin typeface="Segoe UI Light" pitchFamily="34" charset="0"/>
+              <a:cs typeface="Segoe UI Light" pitchFamily="34" charset="0"/>
+            </a:endParaRPr>
+          </a:p>
+          <a:p>
+            <a:pPr algn="ctr"/>
+            <a:endParaRPr lang="en-US" dirty="0">
+              <a:latin typeface="Segoe UI Light" pitchFamily="34" charset="0"/>
+              <a:cs typeface="Segoe UI Light" pitchFamily="34" charset="0"/>
+            </a:endParaRPr>
+          </a:p>
+          <a:p>
+            <a:pPr algn="ctr"/>
+            <a:endParaRPr lang="en-US" dirty="0" smtClean="0">
+              <a:latin typeface="Segoe UI Light" pitchFamily="34" charset="0"/>
+              <a:cs typeface="Segoe UI Light" pitchFamily="34" charset="0"/>
+            </a:endParaRPr>
+          </a:p>
+          <a:p>
+            <a:pPr algn="ctr"/>
+            <a:endParaRPr lang="en-US" dirty="0">
+              <a:latin typeface="Segoe UI Light" pitchFamily="34" charset="0"/>
+              <a:cs typeface="Segoe UI Light" pitchFamily="34" charset="0"/>
+            </a:endParaRPr>
+          </a:p>
+          <a:p>
+            <a:pPr algn="ctr"/>
+            <a:endParaRPr lang="en-US" dirty="0" smtClean="0">
+              <a:latin typeface="Segoe UI Light" pitchFamily="34" charset="0"/>
+              <a:cs typeface="Segoe UI Light" pitchFamily="34" charset="0"/>
+            </a:endParaRPr>
+          </a:p>
+          <a:p>
+            <a:pPr algn="ctr">
+              <a:lnSpc>
+                <a:spcPct val="120000"/>
+              </a:lnSpc>
+            </a:pPr>
+            <a:r>
+              <a:rPr lang="uk-UA" i="1" dirty="0">
+                <a:latin typeface="Segoe UI Light" pitchFamily="34" charset="0"/>
+                <a:cs typeface="Segoe UI Light" pitchFamily="34" charset="0"/>
+              </a:rPr>
+              <a:t>У сфері машинобудування та суміжних галузей найбільш зручним</a:t>
+            </a:r>
+          </a:p>
+          <a:p>
+            <a:pPr algn="ctr">
+              <a:lnSpc>
+                <a:spcPct val="120000"/>
+              </a:lnSpc>
+            </a:pPr>
+            <a:r>
+              <a:rPr lang="uk-UA" i="1" dirty="0">
+                <a:latin typeface="Segoe UI Light" pitchFamily="34" charset="0"/>
+                <a:cs typeface="Segoe UI Light" pitchFamily="34" charset="0"/>
+              </a:rPr>
+              <a:t>форматом для зберігання даних про 3</a:t>
+            </a:r>
+            <a:r>
+              <a:rPr lang="en-US" i="1" dirty="0">
+                <a:latin typeface="Segoe UI Light" pitchFamily="34" charset="0"/>
+                <a:cs typeface="Segoe UI Light" pitchFamily="34" charset="0"/>
+              </a:rPr>
+              <a:t>D-</a:t>
+            </a:r>
+            <a:r>
+              <a:rPr lang="uk-UA" i="1" dirty="0">
+                <a:latin typeface="Segoe UI Light" pitchFamily="34" charset="0"/>
+                <a:cs typeface="Segoe UI Light" pitchFamily="34" charset="0"/>
+              </a:rPr>
+              <a:t>моделі можна вважати 3</a:t>
+            </a:r>
+            <a:r>
+              <a:rPr lang="en-US" i="1" dirty="0">
+                <a:latin typeface="Segoe UI Light" pitchFamily="34" charset="0"/>
+                <a:cs typeface="Segoe UI Light" pitchFamily="34" charset="0"/>
+              </a:rPr>
+              <a:t>D </a:t>
+            </a:r>
+            <a:r>
+              <a:rPr lang="en-US" i="1" dirty="0" smtClean="0">
+                <a:latin typeface="Segoe UI Light" pitchFamily="34" charset="0"/>
+                <a:cs typeface="Segoe UI Light" pitchFamily="34" charset="0"/>
+              </a:rPr>
+              <a:t>PDF.</a:t>
+            </a:r>
+            <a:endParaRPr lang="en-US" i="1" dirty="0">
+              <a:latin typeface="Segoe UI Light" pitchFamily="34" charset="0"/>
+              <a:cs typeface="Segoe UI Light" pitchFamily="34" charset="0"/>
+            </a:endParaRPr>
+          </a:p>
+          <a:p>
+            <a:pPr algn="ctr">
+              <a:lnSpc>
+                <a:spcPct val="120000"/>
+              </a:lnSpc>
+            </a:pPr>
+            <a:r>
+              <a:rPr lang="uk-UA" i="1" dirty="0">
+                <a:latin typeface="Segoe UI Light" pitchFamily="34" charset="0"/>
+                <a:cs typeface="Segoe UI Light" pitchFamily="34" charset="0"/>
+              </a:rPr>
+              <a:t>Можливість легкого вбудовування в </a:t>
+            </a:r>
+            <a:r>
+              <a:rPr lang="en-US" i="1" dirty="0">
+                <a:latin typeface="Segoe UI Light" pitchFamily="34" charset="0"/>
+                <a:cs typeface="Segoe UI Light" pitchFamily="34" charset="0"/>
+              </a:rPr>
+              <a:t>PDF </a:t>
+            </a:r>
+            <a:r>
+              <a:rPr lang="uk-UA" i="1" dirty="0">
+                <a:latin typeface="Segoe UI Light" pitchFamily="34" charset="0"/>
+                <a:cs typeface="Segoe UI Light" pitchFamily="34" charset="0"/>
+              </a:rPr>
+              <a:t>документ об’єкта </a:t>
+            </a:r>
+            <a:r>
+              <a:rPr lang="en-US" i="1" dirty="0" smtClean="0">
+                <a:latin typeface="Segoe UI Light" pitchFamily="34" charset="0"/>
+                <a:cs typeface="Segoe UI Light" pitchFamily="34" charset="0"/>
+              </a:rPr>
+              <a:t>U3D</a:t>
+            </a:r>
+            <a:r>
+              <a:rPr lang="uk-UA" i="1" dirty="0" smtClean="0">
+                <a:latin typeface="Segoe UI Light" pitchFamily="34" charset="0"/>
+                <a:cs typeface="Segoe UI Light" pitchFamily="34" charset="0"/>
+              </a:rPr>
+              <a:t>,</a:t>
+            </a:r>
+            <a:r>
+              <a:rPr lang="en-US" i="1" dirty="0" smtClean="0">
+                <a:latin typeface="Segoe UI Light" pitchFamily="34" charset="0"/>
+                <a:cs typeface="Segoe UI Light" pitchFamily="34" charset="0"/>
+              </a:rPr>
+              <a:t> </a:t>
+            </a:r>
+            <a:r>
+              <a:rPr lang="uk-UA" i="1" dirty="0">
+                <a:latin typeface="Segoe UI Light" pitchFamily="34" charset="0"/>
+                <a:cs typeface="Segoe UI Light" pitchFamily="34" charset="0"/>
+              </a:rPr>
+              <a:t>відкриває</a:t>
+            </a:r>
+          </a:p>
+          <a:p>
+            <a:pPr algn="ctr">
+              <a:lnSpc>
+                <a:spcPct val="120000"/>
+              </a:lnSpc>
+            </a:pPr>
+            <a:r>
+              <a:rPr lang="uk-UA" i="1" dirty="0">
+                <a:latin typeface="Segoe UI Light" pitchFamily="34" charset="0"/>
+                <a:cs typeface="Segoe UI Light" pitchFamily="34" charset="0"/>
+              </a:rPr>
+              <a:t>потребу в засобах швидкого та простого створення моделей цього формату, їх</a:t>
+            </a:r>
+          </a:p>
+          <a:p>
+            <a:pPr algn="ctr">
+              <a:lnSpc>
+                <a:spcPct val="120000"/>
+              </a:lnSpc>
+            </a:pPr>
+            <a:r>
+              <a:rPr lang="uk-UA" i="1" dirty="0">
+                <a:latin typeface="Segoe UI Light" pitchFamily="34" charset="0"/>
+                <a:cs typeface="Segoe UI Light" pitchFamily="34" charset="0"/>
+              </a:rPr>
+              <a:t>конвертації між іншими типами файлів.</a:t>
+            </a:r>
+            <a:endParaRPr lang="uk-UA" i="1" dirty="0" smtClean="0">
+              <a:latin typeface="Segoe UI Light" pitchFamily="34" charset="0"/>
+              <a:cs typeface="Segoe UI Light" pitchFamily="34" charset="0"/>
+            </a:endParaRPr>
           </a:p>
         </p:txBody>
       </p:sp>

</xml_diff>

<commit_message>
Presentation: completed slide about file format
</commit_message>
<xml_diff>
--- a/CourseProject/Presentation/U3DSpace.pptx
+++ b/CourseProject/Presentation/U3DSpace.pptx
@@ -7,9 +7,13 @@
   <p:sldIdLst>
     <p:sldId id="256" r:id="rId2"/>
     <p:sldId id="257" r:id="rId3"/>
-    <p:sldId id="260" r:id="rId4"/>
-    <p:sldId id="259" r:id="rId5"/>
-    <p:sldId id="258" r:id="rId6"/>
+    <p:sldId id="265" r:id="rId4"/>
+    <p:sldId id="261" r:id="rId5"/>
+    <p:sldId id="262" r:id="rId6"/>
+    <p:sldId id="263" r:id="rId7"/>
+    <p:sldId id="264" r:id="rId8"/>
+    <p:sldId id="259" r:id="rId9"/>
+    <p:sldId id="258" r:id="rId10"/>
   </p:sldIdLst>
   <p:sldSz cx="9144000" cy="6858000" type="screen4x3"/>
   <p:notesSz cx="6858000" cy="9144000"/>
@@ -3927,7 +3931,7 @@
         <p:spPr>
           <a:xfrm>
             <a:off x="179512" y="188640"/>
-            <a:ext cx="8784976" cy="369332"/>
+            <a:ext cx="8784976" cy="5355312"/>
           </a:xfrm>
           <a:prstGeom prst="rect">
             <a:avLst/>
@@ -3942,13 +3946,351 @@
           <a:p>
             <a:pPr algn="ctr"/>
             <a:r>
-              <a:rPr lang="uk-UA" dirty="0" err="1" smtClean="0">
-                <a:latin typeface="Segoe UI Light" pitchFamily="34" charset="0"/>
-                <a:cs typeface="Segoe UI Light" pitchFamily="34" charset="0"/>
-              </a:rPr>
-              <a:t>іва</a:t>
-            </a:r>
-            <a:endParaRPr lang="uk-UA" dirty="0" smtClean="0">
+              <a:rPr lang="uk-UA" b="1" dirty="0">
+                <a:latin typeface="Segoe UI Light" pitchFamily="34" charset="0"/>
+                <a:cs typeface="Segoe UI Light" pitchFamily="34" charset="0"/>
+              </a:rPr>
+              <a:t>Про обраний формат</a:t>
+            </a:r>
+            <a:endParaRPr lang="uk-UA" b="1" dirty="0" smtClean="0">
+              <a:latin typeface="Segoe UI Light" pitchFamily="34" charset="0"/>
+              <a:cs typeface="Segoe UI Light" pitchFamily="34" charset="0"/>
+            </a:endParaRPr>
+          </a:p>
+          <a:p>
+            <a:pPr algn="ctr"/>
+            <a:endParaRPr lang="uk-UA" dirty="0">
+              <a:latin typeface="Segoe UI Light" pitchFamily="34" charset="0"/>
+              <a:cs typeface="Segoe UI Light" pitchFamily="34" charset="0"/>
+            </a:endParaRPr>
+          </a:p>
+          <a:p>
+            <a:pPr algn="ctr"/>
+            <a:endParaRPr lang="en-US" dirty="0" smtClean="0">
+              <a:latin typeface="Segoe UI Light" pitchFamily="34" charset="0"/>
+              <a:cs typeface="Segoe UI Light" pitchFamily="34" charset="0"/>
+            </a:endParaRPr>
+          </a:p>
+          <a:p>
+            <a:pPr algn="ctr"/>
+            <a:endParaRPr lang="en-US" dirty="0" smtClean="0">
+              <a:latin typeface="Segoe UI Light" pitchFamily="34" charset="0"/>
+              <a:cs typeface="Segoe UI Light" pitchFamily="34" charset="0"/>
+            </a:endParaRPr>
+          </a:p>
+          <a:p>
+            <a:pPr algn="just">
+              <a:lnSpc>
+                <a:spcPct val="150000"/>
+              </a:lnSpc>
+            </a:pPr>
+            <a:r>
+              <a:rPr lang="uk-UA" dirty="0">
+                <a:latin typeface="Segoe UI Light" pitchFamily="34" charset="0"/>
+                <a:cs typeface="Segoe UI Light" pitchFamily="34" charset="0"/>
+              </a:rPr>
+              <a:t>	</a:t>
+            </a:r>
+            <a:r>
+              <a:rPr lang="uk-UA" dirty="0" smtClean="0">
+                <a:latin typeface="Segoe UI Light" pitchFamily="34" charset="0"/>
+                <a:cs typeface="Segoe UI Light" pitchFamily="34" charset="0"/>
+              </a:rPr>
+              <a:t>Серед </a:t>
+            </a:r>
+            <a:r>
+              <a:rPr lang="uk-UA" dirty="0">
+                <a:latin typeface="Segoe UI Light" pitchFamily="34" charset="0"/>
+                <a:cs typeface="Segoe UI Light" pitchFamily="34" charset="0"/>
+              </a:rPr>
+              <a:t>невеликої кількості існуючих поширених відкритих форматів </a:t>
+            </a:r>
+            <a:r>
+              <a:rPr lang="en-US" dirty="0">
+                <a:latin typeface="Segoe UI Light" pitchFamily="34" charset="0"/>
+                <a:cs typeface="Segoe UI Light" pitchFamily="34" charset="0"/>
+              </a:rPr>
+              <a:t>3D</a:t>
+            </a:r>
+            <a:r>
+              <a:rPr lang="uk-UA" dirty="0">
+                <a:latin typeface="Segoe UI Light" pitchFamily="34" charset="0"/>
+                <a:cs typeface="Segoe UI Light" pitchFamily="34" charset="0"/>
+              </a:rPr>
+              <a:t> </a:t>
+            </a:r>
+            <a:r>
+              <a:rPr lang="uk-UA" dirty="0" smtClean="0">
+                <a:latin typeface="Segoe UI Light" pitchFamily="34" charset="0"/>
+                <a:cs typeface="Segoe UI Light" pitchFamily="34" charset="0"/>
+              </a:rPr>
+              <a:t>даних (наприклад </a:t>
+            </a:r>
+            <a:r>
+              <a:rPr lang="en-US" b="1" dirty="0">
+                <a:latin typeface="Segoe UI Light" pitchFamily="34" charset="0"/>
+                <a:cs typeface="Segoe UI Light" pitchFamily="34" charset="0"/>
+              </a:rPr>
+              <a:t>OBJ</a:t>
+            </a:r>
+            <a:r>
+              <a:rPr lang="en-US" dirty="0">
+                <a:latin typeface="Segoe UI Light" pitchFamily="34" charset="0"/>
+                <a:cs typeface="Segoe UI Light" pitchFamily="34" charset="0"/>
+              </a:rPr>
+              <a:t>, </a:t>
+            </a:r>
+            <a:r>
+              <a:rPr lang="en-US" b="1" dirty="0">
+                <a:latin typeface="Segoe UI Light" pitchFamily="34" charset="0"/>
+                <a:cs typeface="Segoe UI Light" pitchFamily="34" charset="0"/>
+              </a:rPr>
+              <a:t>STL</a:t>
+            </a:r>
+            <a:r>
+              <a:rPr lang="en-US" dirty="0">
+                <a:latin typeface="Segoe UI Light" pitchFamily="34" charset="0"/>
+                <a:cs typeface="Segoe UI Light" pitchFamily="34" charset="0"/>
+              </a:rPr>
+              <a:t>, </a:t>
+            </a:r>
+            <a:r>
+              <a:rPr lang="en-US" b="1" dirty="0">
+                <a:latin typeface="Segoe UI Light" pitchFamily="34" charset="0"/>
+                <a:cs typeface="Segoe UI Light" pitchFamily="34" charset="0"/>
+              </a:rPr>
+              <a:t>COLLADA</a:t>
+            </a:r>
+            <a:r>
+              <a:rPr lang="en-US" dirty="0">
+                <a:latin typeface="Segoe UI Light" pitchFamily="34" charset="0"/>
+                <a:cs typeface="Segoe UI Light" pitchFamily="34" charset="0"/>
+              </a:rPr>
+              <a:t>, </a:t>
+            </a:r>
+            <a:r>
+              <a:rPr lang="en-US" b="1" dirty="0">
+                <a:latin typeface="Segoe UI Light" pitchFamily="34" charset="0"/>
+                <a:cs typeface="Segoe UI Light" pitchFamily="34" charset="0"/>
+              </a:rPr>
+              <a:t>3D XML</a:t>
+            </a:r>
+            <a:r>
+              <a:rPr lang="en-US" dirty="0">
+                <a:latin typeface="Segoe UI Light" pitchFamily="34" charset="0"/>
+                <a:cs typeface="Segoe UI Light" pitchFamily="34" charset="0"/>
+              </a:rPr>
+              <a:t>, </a:t>
+            </a:r>
+            <a:r>
+              <a:rPr lang="en-US" b="1" dirty="0" err="1" smtClean="0">
+                <a:latin typeface="Segoe UI Light" pitchFamily="34" charset="0"/>
+                <a:cs typeface="Segoe UI Light" pitchFamily="34" charset="0"/>
+              </a:rPr>
+              <a:t>glTF</a:t>
+            </a:r>
+            <a:r>
+              <a:rPr lang="uk-UA" b="1" dirty="0" smtClean="0">
+                <a:latin typeface="Segoe UI Light" pitchFamily="34" charset="0"/>
+                <a:cs typeface="Segoe UI Light" pitchFamily="34" charset="0"/>
+              </a:rPr>
+              <a:t>)</a:t>
+            </a:r>
+            <a:r>
+              <a:rPr lang="uk-UA" dirty="0" smtClean="0">
+                <a:latin typeface="Segoe UI Light" pitchFamily="34" charset="0"/>
+                <a:cs typeface="Segoe UI Light" pitchFamily="34" charset="0"/>
+              </a:rPr>
+              <a:t>, формат </a:t>
+            </a:r>
+            <a:r>
+              <a:rPr lang="en-US" b="1" dirty="0">
+                <a:latin typeface="Segoe UI Light" pitchFamily="34" charset="0"/>
+                <a:cs typeface="Segoe UI Light" pitchFamily="34" charset="0"/>
+              </a:rPr>
+              <a:t>Universal 3D</a:t>
+            </a:r>
+            <a:r>
+              <a:rPr lang="en-US" dirty="0">
+                <a:latin typeface="Segoe UI Light" pitchFamily="34" charset="0"/>
+                <a:cs typeface="Segoe UI Light" pitchFamily="34" charset="0"/>
+              </a:rPr>
+              <a:t> </a:t>
+            </a:r>
+            <a:r>
+              <a:rPr lang="uk-UA" dirty="0">
+                <a:latin typeface="Segoe UI Light" pitchFamily="34" charset="0"/>
+                <a:cs typeface="Segoe UI Light" pitchFamily="34" charset="0"/>
+              </a:rPr>
+              <a:t>вирізняється рядом властивостей, що забезпечують зручність і </a:t>
+            </a:r>
+            <a:r>
+              <a:rPr lang="uk-UA" dirty="0" smtClean="0">
+                <a:latin typeface="Segoe UI Light" pitchFamily="34" charset="0"/>
+                <a:cs typeface="Segoe UI Light" pitchFamily="34" charset="0"/>
+              </a:rPr>
+              <a:t>ефективність роботи </a:t>
+            </a:r>
+            <a:r>
+              <a:rPr lang="uk-UA" dirty="0">
+                <a:latin typeface="Segoe UI Light" pitchFamily="34" charset="0"/>
+                <a:cs typeface="Segoe UI Light" pitchFamily="34" charset="0"/>
+              </a:rPr>
+              <a:t>при його використанні</a:t>
+            </a:r>
+            <a:r>
+              <a:rPr lang="uk-UA" dirty="0" smtClean="0">
+                <a:latin typeface="Segoe UI Light" pitchFamily="34" charset="0"/>
+                <a:cs typeface="Segoe UI Light" pitchFamily="34" charset="0"/>
+              </a:rPr>
+              <a:t>:</a:t>
+            </a:r>
+          </a:p>
+          <a:p>
+            <a:pPr marL="1200150" lvl="2" indent="-285750" algn="just">
+              <a:lnSpc>
+                <a:spcPct val="150000"/>
+              </a:lnSpc>
+              <a:buFont typeface="Arial" pitchFamily="34" charset="0"/>
+              <a:buChar char="•"/>
+            </a:pPr>
+            <a:r>
+              <a:rPr lang="uk-UA" i="1" dirty="0" smtClean="0">
+                <a:latin typeface="Segoe UI Light" pitchFamily="34" charset="0"/>
+                <a:cs typeface="Segoe UI Light" pitchFamily="34" charset="0"/>
+              </a:rPr>
+              <a:t>може вбудовуватися в </a:t>
+            </a:r>
+            <a:r>
+              <a:rPr lang="en-US" i="1" dirty="0" smtClean="0">
+                <a:latin typeface="Segoe UI Light" pitchFamily="34" charset="0"/>
+                <a:cs typeface="Segoe UI Light" pitchFamily="34" charset="0"/>
+              </a:rPr>
+              <a:t>PDF (3D PDF);</a:t>
+            </a:r>
+          </a:p>
+          <a:p>
+            <a:pPr marL="1200150" lvl="2" indent="-285750" algn="just">
+              <a:lnSpc>
+                <a:spcPct val="150000"/>
+              </a:lnSpc>
+              <a:buFont typeface="Arial" pitchFamily="34" charset="0"/>
+              <a:buChar char="•"/>
+            </a:pPr>
+            <a:r>
+              <a:rPr lang="uk-UA" i="1" dirty="0">
+                <a:latin typeface="Segoe UI Light" pitchFamily="34" charset="0"/>
+                <a:cs typeface="Segoe UI Light" pitchFamily="34" charset="0"/>
+              </a:rPr>
+              <a:t>підтримує збереження у стисненому форматі</a:t>
+            </a:r>
+            <a:r>
+              <a:rPr lang="en-US" i="1" dirty="0" smtClean="0">
+                <a:latin typeface="Segoe UI Light" pitchFamily="34" charset="0"/>
+                <a:cs typeface="Segoe UI Light" pitchFamily="34" charset="0"/>
+              </a:rPr>
+              <a:t>;</a:t>
+            </a:r>
+          </a:p>
+          <a:p>
+            <a:pPr marL="1200150" lvl="2" indent="-285750" algn="just">
+              <a:lnSpc>
+                <a:spcPct val="150000"/>
+              </a:lnSpc>
+              <a:buFont typeface="Arial" pitchFamily="34" charset="0"/>
+              <a:buChar char="•"/>
+            </a:pPr>
+            <a:r>
+              <a:rPr lang="uk-UA" i="1" dirty="0" smtClean="0">
+                <a:latin typeface="Segoe UI Light" pitchFamily="34" charset="0"/>
+                <a:cs typeface="Segoe UI Light" pitchFamily="34" charset="0"/>
+              </a:rPr>
+              <a:t>підтримує всі необхідні компоненти для сучасного представлення     </a:t>
+            </a:r>
+            <a:r>
+              <a:rPr lang="en-US" i="1" dirty="0" smtClean="0">
+                <a:latin typeface="Segoe UI Light" pitchFamily="34" charset="0"/>
+                <a:cs typeface="Segoe UI Light" pitchFamily="34" charset="0"/>
+              </a:rPr>
+              <a:t>3D-</a:t>
+            </a:r>
+            <a:r>
+              <a:rPr lang="uk-UA" i="1" dirty="0" smtClean="0">
+                <a:latin typeface="Segoe UI Light" pitchFamily="34" charset="0"/>
+                <a:cs typeface="Segoe UI Light" pitchFamily="34" charset="0"/>
+              </a:rPr>
+              <a:t>об</a:t>
+            </a:r>
+            <a:r>
+              <a:rPr lang="en-US" i="1" dirty="0" smtClean="0">
+                <a:latin typeface="Segoe UI Light" pitchFamily="34" charset="0"/>
+                <a:cs typeface="Segoe UI Light" pitchFamily="34" charset="0"/>
+              </a:rPr>
+              <a:t>’</a:t>
+            </a:r>
+            <a:r>
+              <a:rPr lang="uk-UA" i="1" dirty="0" err="1" smtClean="0">
+                <a:latin typeface="Segoe UI Light" pitchFamily="34" charset="0"/>
+                <a:cs typeface="Segoe UI Light" pitchFamily="34" charset="0"/>
+              </a:rPr>
+              <a:t>єктів</a:t>
+            </a:r>
+            <a:r>
+              <a:rPr lang="en-US" i="1" dirty="0" smtClean="0">
+                <a:latin typeface="Segoe UI Light" pitchFamily="34" charset="0"/>
+                <a:cs typeface="Segoe UI Light" pitchFamily="34" charset="0"/>
+              </a:rPr>
+              <a:t>;</a:t>
+            </a:r>
+            <a:endParaRPr lang="uk-UA" i="1" dirty="0" smtClean="0">
+              <a:latin typeface="Segoe UI Light" pitchFamily="34" charset="0"/>
+              <a:cs typeface="Segoe UI Light" pitchFamily="34" charset="0"/>
+            </a:endParaRPr>
+          </a:p>
+          <a:p>
+            <a:pPr marL="1200150" lvl="2" indent="-285750" algn="just">
+              <a:lnSpc>
+                <a:spcPct val="150000"/>
+              </a:lnSpc>
+              <a:buFont typeface="Arial" pitchFamily="34" charset="0"/>
+              <a:buChar char="•"/>
+            </a:pPr>
+            <a:r>
+              <a:rPr lang="uk-UA" i="1" dirty="0" smtClean="0">
+                <a:latin typeface="Segoe UI Light" pitchFamily="34" charset="0"/>
+                <a:cs typeface="Segoe UI Light" pitchFamily="34" charset="0"/>
+              </a:rPr>
+              <a:t>після запакування в </a:t>
+            </a:r>
+            <a:r>
+              <a:rPr lang="en-US" i="1" dirty="0" smtClean="0">
+                <a:latin typeface="Segoe UI Light" pitchFamily="34" charset="0"/>
+                <a:cs typeface="Segoe UI Light" pitchFamily="34" charset="0"/>
+              </a:rPr>
+              <a:t>PDF</a:t>
+            </a:r>
+            <a:r>
+              <a:rPr lang="uk-UA" i="1" dirty="0" smtClean="0">
+                <a:latin typeface="Segoe UI Light" pitchFamily="34" charset="0"/>
+                <a:cs typeface="Segoe UI Light" pitchFamily="34" charset="0"/>
+              </a:rPr>
+              <a:t>, може бути переглянутий в безкоштовній  популярній програмі </a:t>
+            </a:r>
+            <a:r>
+              <a:rPr lang="en-US" i="1" dirty="0" smtClean="0">
+                <a:latin typeface="Segoe UI Light" pitchFamily="34" charset="0"/>
+                <a:cs typeface="Segoe UI Light" pitchFamily="34" charset="0"/>
+              </a:rPr>
+              <a:t>Adobe Acrobat Reader</a:t>
+            </a:r>
+            <a:r>
+              <a:rPr lang="uk-UA" i="1" dirty="0" smtClean="0">
+                <a:latin typeface="Segoe UI Light" pitchFamily="34" charset="0"/>
+                <a:cs typeface="Segoe UI Light" pitchFamily="34" charset="0"/>
+              </a:rPr>
+              <a:t>.</a:t>
+            </a:r>
+            <a:endParaRPr lang="uk-UA" i="1" dirty="0" smtClean="0">
               <a:latin typeface="Segoe UI Light" pitchFamily="34" charset="0"/>
               <a:cs typeface="Segoe UI Light" pitchFamily="34" charset="0"/>
             </a:endParaRPr>
@@ -3958,7 +4300,7 @@
     </p:spTree>
     <p:extLst>
       <p:ext uri="{BB962C8B-B14F-4D97-AF65-F5344CB8AC3E}">
-        <p14:creationId xmlns:p14="http://schemas.microsoft.com/office/powerpoint/2010/main" val="3786932489"/>
+        <p14:creationId xmlns:p14="http://schemas.microsoft.com/office/powerpoint/2010/main" val="2247441377"/>
       </p:ext>
     </p:extLst>
   </p:cSld>
@@ -4001,6 +4343,479 @@
         <p:spPr>
           <a:xfrm>
             <a:off x="179512" y="188640"/>
+            <a:ext cx="8784976" cy="1477328"/>
+          </a:xfrm>
+          <a:prstGeom prst="rect">
+            <a:avLst/>
+          </a:prstGeom>
+          <a:noFill/>
+        </p:spPr>
+        <p:txBody>
+          <a:bodyPr wrap="square" rtlCol="0">
+            <a:spAutoFit/>
+          </a:bodyPr>
+          <a:lstStyle/>
+          <a:p>
+            <a:pPr algn="ctr"/>
+            <a:r>
+              <a:rPr lang="uk-UA" b="1" dirty="0" smtClean="0">
+                <a:latin typeface="Segoe UI Light" pitchFamily="34" charset="0"/>
+                <a:cs typeface="Segoe UI Light" pitchFamily="34" charset="0"/>
+              </a:rPr>
+              <a:t>Структура класів бібліотеки</a:t>
+            </a:r>
+          </a:p>
+          <a:p>
+            <a:pPr algn="ctr"/>
+            <a:endParaRPr lang="uk-UA" dirty="0">
+              <a:latin typeface="Segoe UI Light" pitchFamily="34" charset="0"/>
+              <a:cs typeface="Segoe UI Light" pitchFamily="34" charset="0"/>
+            </a:endParaRPr>
+          </a:p>
+          <a:p>
+            <a:pPr algn="ctr"/>
+            <a:endParaRPr lang="uk-UA" dirty="0" smtClean="0">
+              <a:latin typeface="Segoe UI Light" pitchFamily="34" charset="0"/>
+              <a:cs typeface="Segoe UI Light" pitchFamily="34" charset="0"/>
+            </a:endParaRPr>
+          </a:p>
+          <a:p>
+            <a:pPr algn="ctr"/>
+            <a:endParaRPr lang="uk-UA" dirty="0">
+              <a:latin typeface="Segoe UI Light" pitchFamily="34" charset="0"/>
+              <a:cs typeface="Segoe UI Light" pitchFamily="34" charset="0"/>
+            </a:endParaRPr>
+          </a:p>
+          <a:p>
+            <a:pPr algn="ctr"/>
+            <a:r>
+              <a:rPr lang="uk-UA" dirty="0" smtClean="0">
+                <a:latin typeface="Segoe UI Light" pitchFamily="34" charset="0"/>
+                <a:cs typeface="Segoe UI Light" pitchFamily="34" charset="0"/>
+              </a:rPr>
+              <a:t>текст</a:t>
+            </a:r>
+            <a:endParaRPr lang="uk-UA" dirty="0" smtClean="0">
+              <a:latin typeface="Segoe UI Light" pitchFamily="34" charset="0"/>
+              <a:cs typeface="Segoe UI Light" pitchFamily="34" charset="0"/>
+            </a:endParaRPr>
+          </a:p>
+        </p:txBody>
+      </p:sp>
+    </p:spTree>
+    <p:extLst>
+      <p:ext uri="{BB962C8B-B14F-4D97-AF65-F5344CB8AC3E}">
+        <p14:creationId xmlns:p14="http://schemas.microsoft.com/office/powerpoint/2010/main" val="3788224019"/>
+      </p:ext>
+    </p:extLst>
+  </p:cSld>
+  <p:clrMapOvr>
+    <a:masterClrMapping/>
+  </p:clrMapOvr>
+  <p:timing>
+    <p:tnLst>
+      <p:par>
+        <p:cTn id="1" dur="indefinite" restart="never" nodeType="tmRoot"/>
+      </p:par>
+    </p:tnLst>
+  </p:timing>
+</p:sld>
+</file>
+
+<file path=ppt/slides/slide5.xml><?xml version="1.0" encoding="utf-8"?>
+<p:sld xmlns:a="http://schemas.openxmlformats.org/drawingml/2006/main" xmlns:r="http://schemas.openxmlformats.org/officeDocument/2006/relationships" xmlns:p="http://schemas.openxmlformats.org/presentationml/2006/main">
+  <p:cSld>
+    <p:spTree>
+      <p:nvGrpSpPr>
+        <p:cNvPr id="1" name=""/>
+        <p:cNvGrpSpPr/>
+        <p:nvPr/>
+      </p:nvGrpSpPr>
+      <p:grpSpPr>
+        <a:xfrm>
+          <a:off x="0" y="0"/>
+          <a:ext cx="0" cy="0"/>
+          <a:chOff x="0" y="0"/>
+          <a:chExt cx="0" cy="0"/>
+        </a:xfrm>
+      </p:grpSpPr>
+      <p:sp>
+        <p:nvSpPr>
+          <p:cNvPr id="2" name="TextBox 1"/>
+          <p:cNvSpPr txBox="1"/>
+          <p:nvPr/>
+        </p:nvSpPr>
+        <p:spPr>
+          <a:xfrm>
+            <a:off x="179512" y="188640"/>
+            <a:ext cx="8784976" cy="1477328"/>
+          </a:xfrm>
+          <a:prstGeom prst="rect">
+            <a:avLst/>
+          </a:prstGeom>
+          <a:noFill/>
+        </p:spPr>
+        <p:txBody>
+          <a:bodyPr wrap="square" rtlCol="0">
+            <a:spAutoFit/>
+          </a:bodyPr>
+          <a:lstStyle/>
+          <a:p>
+            <a:pPr algn="ctr"/>
+            <a:r>
+              <a:rPr lang="uk-UA" b="1" dirty="0" smtClean="0">
+                <a:latin typeface="Segoe UI Light" pitchFamily="34" charset="0"/>
+                <a:cs typeface="Segoe UI Light" pitchFamily="34" charset="0"/>
+              </a:rPr>
+              <a:t>Побудова </a:t>
+            </a:r>
+            <a:r>
+              <a:rPr lang="en-US" b="1" dirty="0" smtClean="0">
+                <a:latin typeface="Segoe UI Light" pitchFamily="34" charset="0"/>
+                <a:cs typeface="Segoe UI Light" pitchFamily="34" charset="0"/>
+              </a:rPr>
+              <a:t>U3D </a:t>
+            </a:r>
+            <a:r>
+              <a:rPr lang="uk-UA" b="1" dirty="0" smtClean="0">
+                <a:latin typeface="Segoe UI Light" pitchFamily="34" charset="0"/>
+                <a:cs typeface="Segoe UI Light" pitchFamily="34" charset="0"/>
+              </a:rPr>
+              <a:t>документу та збереження у файл</a:t>
+            </a:r>
+          </a:p>
+          <a:p>
+            <a:pPr algn="ctr"/>
+            <a:endParaRPr lang="uk-UA" dirty="0">
+              <a:latin typeface="Segoe UI Light" pitchFamily="34" charset="0"/>
+              <a:cs typeface="Segoe UI Light" pitchFamily="34" charset="0"/>
+            </a:endParaRPr>
+          </a:p>
+          <a:p>
+            <a:pPr algn="ctr"/>
+            <a:endParaRPr lang="uk-UA" dirty="0" smtClean="0">
+              <a:latin typeface="Segoe UI Light" pitchFamily="34" charset="0"/>
+              <a:cs typeface="Segoe UI Light" pitchFamily="34" charset="0"/>
+            </a:endParaRPr>
+          </a:p>
+          <a:p>
+            <a:pPr algn="ctr"/>
+            <a:endParaRPr lang="uk-UA" dirty="0">
+              <a:latin typeface="Segoe UI Light" pitchFamily="34" charset="0"/>
+              <a:cs typeface="Segoe UI Light" pitchFamily="34" charset="0"/>
+            </a:endParaRPr>
+          </a:p>
+          <a:p>
+            <a:pPr algn="ctr"/>
+            <a:r>
+              <a:rPr lang="uk-UA" dirty="0" smtClean="0">
+                <a:latin typeface="Segoe UI Light" pitchFamily="34" charset="0"/>
+                <a:cs typeface="Segoe UI Light" pitchFamily="34" charset="0"/>
+              </a:rPr>
+              <a:t>текст</a:t>
+            </a:r>
+            <a:endParaRPr lang="uk-UA" dirty="0" smtClean="0">
+              <a:latin typeface="Segoe UI Light" pitchFamily="34" charset="0"/>
+              <a:cs typeface="Segoe UI Light" pitchFamily="34" charset="0"/>
+            </a:endParaRPr>
+          </a:p>
+        </p:txBody>
+      </p:sp>
+    </p:spTree>
+    <p:extLst>
+      <p:ext uri="{BB962C8B-B14F-4D97-AF65-F5344CB8AC3E}">
+        <p14:creationId xmlns:p14="http://schemas.microsoft.com/office/powerpoint/2010/main" val="3309816977"/>
+      </p:ext>
+    </p:extLst>
+  </p:cSld>
+  <p:clrMapOvr>
+    <a:masterClrMapping/>
+  </p:clrMapOvr>
+  <p:timing>
+    <p:tnLst>
+      <p:par>
+        <p:cTn id="1" dur="indefinite" restart="never" nodeType="tmRoot"/>
+      </p:par>
+    </p:tnLst>
+  </p:timing>
+</p:sld>
+</file>
+
+<file path=ppt/slides/slide6.xml><?xml version="1.0" encoding="utf-8"?>
+<p:sld xmlns:a="http://schemas.openxmlformats.org/drawingml/2006/main" xmlns:r="http://schemas.openxmlformats.org/officeDocument/2006/relationships" xmlns:p="http://schemas.openxmlformats.org/presentationml/2006/main">
+  <p:cSld>
+    <p:spTree>
+      <p:nvGrpSpPr>
+        <p:cNvPr id="1" name=""/>
+        <p:cNvGrpSpPr/>
+        <p:nvPr/>
+      </p:nvGrpSpPr>
+      <p:grpSpPr>
+        <a:xfrm>
+          <a:off x="0" y="0"/>
+          <a:ext cx="0" cy="0"/>
+          <a:chOff x="0" y="0"/>
+          <a:chExt cx="0" cy="0"/>
+        </a:xfrm>
+      </p:grpSpPr>
+      <p:sp>
+        <p:nvSpPr>
+          <p:cNvPr id="2" name="TextBox 1"/>
+          <p:cNvSpPr txBox="1"/>
+          <p:nvPr/>
+        </p:nvSpPr>
+        <p:spPr>
+          <a:xfrm>
+            <a:off x="179512" y="188640"/>
+            <a:ext cx="8784976" cy="1477328"/>
+          </a:xfrm>
+          <a:prstGeom prst="rect">
+            <a:avLst/>
+          </a:prstGeom>
+          <a:noFill/>
+        </p:spPr>
+        <p:txBody>
+          <a:bodyPr wrap="square" rtlCol="0">
+            <a:spAutoFit/>
+          </a:bodyPr>
+          <a:lstStyle/>
+          <a:p>
+            <a:pPr algn="ctr"/>
+            <a:r>
+              <a:rPr lang="uk-UA" b="1" dirty="0" smtClean="0">
+                <a:latin typeface="Segoe UI Light" pitchFamily="34" charset="0"/>
+                <a:cs typeface="Segoe UI Light" pitchFamily="34" charset="0"/>
+              </a:rPr>
+              <a:t>Зчитування даних з</a:t>
+            </a:r>
+            <a:r>
+              <a:rPr lang="uk-UA" b="1" dirty="0" smtClean="0">
+                <a:latin typeface="Segoe UI Light" pitchFamily="34" charset="0"/>
+                <a:cs typeface="Segoe UI Light" pitchFamily="34" charset="0"/>
+              </a:rPr>
+              <a:t> </a:t>
+            </a:r>
+            <a:r>
+              <a:rPr lang="en-US" b="1" dirty="0" smtClean="0">
+                <a:latin typeface="Segoe UI Light" pitchFamily="34" charset="0"/>
+                <a:cs typeface="Segoe UI Light" pitchFamily="34" charset="0"/>
+              </a:rPr>
+              <a:t>U3D </a:t>
+            </a:r>
+            <a:r>
+              <a:rPr lang="uk-UA" b="1" dirty="0" smtClean="0">
+                <a:latin typeface="Segoe UI Light" pitchFamily="34" charset="0"/>
+                <a:cs typeface="Segoe UI Light" pitchFamily="34" charset="0"/>
+              </a:rPr>
+              <a:t>файлу</a:t>
+            </a:r>
+          </a:p>
+          <a:p>
+            <a:pPr algn="ctr"/>
+            <a:endParaRPr lang="uk-UA" dirty="0">
+              <a:latin typeface="Segoe UI Light" pitchFamily="34" charset="0"/>
+              <a:cs typeface="Segoe UI Light" pitchFamily="34" charset="0"/>
+            </a:endParaRPr>
+          </a:p>
+          <a:p>
+            <a:pPr algn="ctr"/>
+            <a:endParaRPr lang="uk-UA" dirty="0" smtClean="0">
+              <a:latin typeface="Segoe UI Light" pitchFamily="34" charset="0"/>
+              <a:cs typeface="Segoe UI Light" pitchFamily="34" charset="0"/>
+            </a:endParaRPr>
+          </a:p>
+          <a:p>
+            <a:pPr algn="ctr"/>
+            <a:endParaRPr lang="uk-UA" dirty="0">
+              <a:latin typeface="Segoe UI Light" pitchFamily="34" charset="0"/>
+              <a:cs typeface="Segoe UI Light" pitchFamily="34" charset="0"/>
+            </a:endParaRPr>
+          </a:p>
+          <a:p>
+            <a:pPr algn="ctr"/>
+            <a:r>
+              <a:rPr lang="uk-UA" dirty="0" smtClean="0">
+                <a:latin typeface="Segoe UI Light" pitchFamily="34" charset="0"/>
+                <a:cs typeface="Segoe UI Light" pitchFamily="34" charset="0"/>
+              </a:rPr>
+              <a:t>текст</a:t>
+            </a:r>
+            <a:endParaRPr lang="uk-UA" dirty="0" smtClean="0">
+              <a:latin typeface="Segoe UI Light" pitchFamily="34" charset="0"/>
+              <a:cs typeface="Segoe UI Light" pitchFamily="34" charset="0"/>
+            </a:endParaRPr>
+          </a:p>
+        </p:txBody>
+      </p:sp>
+    </p:spTree>
+    <p:extLst>
+      <p:ext uri="{BB962C8B-B14F-4D97-AF65-F5344CB8AC3E}">
+        <p14:creationId xmlns:p14="http://schemas.microsoft.com/office/powerpoint/2010/main" val="2441983786"/>
+      </p:ext>
+    </p:extLst>
+  </p:cSld>
+  <p:clrMapOvr>
+    <a:masterClrMapping/>
+  </p:clrMapOvr>
+  <p:timing>
+    <p:tnLst>
+      <p:par>
+        <p:cTn id="1" dur="indefinite" restart="never" nodeType="tmRoot"/>
+      </p:par>
+    </p:tnLst>
+  </p:timing>
+</p:sld>
+</file>
+
+<file path=ppt/slides/slide7.xml><?xml version="1.0" encoding="utf-8"?>
+<p:sld xmlns:a="http://schemas.openxmlformats.org/drawingml/2006/main" xmlns:r="http://schemas.openxmlformats.org/officeDocument/2006/relationships" xmlns:p="http://schemas.openxmlformats.org/presentationml/2006/main">
+  <p:cSld>
+    <p:spTree>
+      <p:nvGrpSpPr>
+        <p:cNvPr id="1" name=""/>
+        <p:cNvGrpSpPr/>
+        <p:nvPr/>
+      </p:nvGrpSpPr>
+      <p:grpSpPr>
+        <a:xfrm>
+          <a:off x="0" y="0"/>
+          <a:ext cx="0" cy="0"/>
+          <a:chOff x="0" y="0"/>
+          <a:chExt cx="0" cy="0"/>
+        </a:xfrm>
+      </p:grpSpPr>
+      <p:sp>
+        <p:nvSpPr>
+          <p:cNvPr id="2" name="TextBox 1"/>
+          <p:cNvSpPr txBox="1"/>
+          <p:nvPr/>
+        </p:nvSpPr>
+        <p:spPr>
+          <a:xfrm>
+            <a:off x="179512" y="188640"/>
+            <a:ext cx="8784976" cy="1477328"/>
+          </a:xfrm>
+          <a:prstGeom prst="rect">
+            <a:avLst/>
+          </a:prstGeom>
+          <a:noFill/>
+        </p:spPr>
+        <p:txBody>
+          <a:bodyPr wrap="square" rtlCol="0">
+            <a:spAutoFit/>
+          </a:bodyPr>
+          <a:lstStyle/>
+          <a:p>
+            <a:pPr algn="ctr"/>
+            <a:r>
+              <a:rPr lang="uk-UA" b="1" dirty="0" smtClean="0">
+                <a:latin typeface="Segoe UI Light" pitchFamily="34" charset="0"/>
+                <a:cs typeface="Segoe UI Light" pitchFamily="34" charset="0"/>
+              </a:rPr>
+              <a:t>Об</a:t>
+            </a:r>
+            <a:r>
+              <a:rPr lang="en-US" b="1" dirty="0" smtClean="0">
+                <a:latin typeface="Segoe UI Light" pitchFamily="34" charset="0"/>
+                <a:cs typeface="Segoe UI Light" pitchFamily="34" charset="0"/>
+              </a:rPr>
+              <a:t>’</a:t>
+            </a:r>
+            <a:r>
+              <a:rPr lang="uk-UA" b="1" dirty="0" smtClean="0">
+                <a:latin typeface="Segoe UI Light" pitchFamily="34" charset="0"/>
+                <a:cs typeface="Segoe UI Light" pitchFamily="34" charset="0"/>
+              </a:rPr>
+              <a:t>єднання двох документів</a:t>
+            </a:r>
+            <a:endParaRPr lang="uk-UA" b="1" dirty="0" smtClean="0">
+              <a:latin typeface="Segoe UI Light" pitchFamily="34" charset="0"/>
+              <a:cs typeface="Segoe UI Light" pitchFamily="34" charset="0"/>
+            </a:endParaRPr>
+          </a:p>
+          <a:p>
+            <a:pPr algn="ctr"/>
+            <a:endParaRPr lang="uk-UA" dirty="0">
+              <a:latin typeface="Segoe UI Light" pitchFamily="34" charset="0"/>
+              <a:cs typeface="Segoe UI Light" pitchFamily="34" charset="0"/>
+            </a:endParaRPr>
+          </a:p>
+          <a:p>
+            <a:pPr algn="ctr"/>
+            <a:endParaRPr lang="uk-UA" dirty="0" smtClean="0">
+              <a:latin typeface="Segoe UI Light" pitchFamily="34" charset="0"/>
+              <a:cs typeface="Segoe UI Light" pitchFamily="34" charset="0"/>
+            </a:endParaRPr>
+          </a:p>
+          <a:p>
+            <a:pPr algn="ctr"/>
+            <a:endParaRPr lang="uk-UA" dirty="0">
+              <a:latin typeface="Segoe UI Light" pitchFamily="34" charset="0"/>
+              <a:cs typeface="Segoe UI Light" pitchFamily="34" charset="0"/>
+            </a:endParaRPr>
+          </a:p>
+          <a:p>
+            <a:pPr algn="ctr"/>
+            <a:r>
+              <a:rPr lang="uk-UA" dirty="0" smtClean="0">
+                <a:latin typeface="Segoe UI Light" pitchFamily="34" charset="0"/>
+                <a:cs typeface="Segoe UI Light" pitchFamily="34" charset="0"/>
+              </a:rPr>
+              <a:t>текст</a:t>
+            </a:r>
+            <a:endParaRPr lang="uk-UA" dirty="0" smtClean="0">
+              <a:latin typeface="Segoe UI Light" pitchFamily="34" charset="0"/>
+              <a:cs typeface="Segoe UI Light" pitchFamily="34" charset="0"/>
+            </a:endParaRPr>
+          </a:p>
+        </p:txBody>
+      </p:sp>
+    </p:spTree>
+    <p:extLst>
+      <p:ext uri="{BB962C8B-B14F-4D97-AF65-F5344CB8AC3E}">
+        <p14:creationId xmlns:p14="http://schemas.microsoft.com/office/powerpoint/2010/main" val="1656181819"/>
+      </p:ext>
+    </p:extLst>
+  </p:cSld>
+  <p:clrMapOvr>
+    <a:masterClrMapping/>
+  </p:clrMapOvr>
+  <p:timing>
+    <p:tnLst>
+      <p:par>
+        <p:cTn id="1" dur="indefinite" restart="never" nodeType="tmRoot"/>
+      </p:par>
+    </p:tnLst>
+  </p:timing>
+</p:sld>
+</file>
+
+<file path=ppt/slides/slide8.xml><?xml version="1.0" encoding="utf-8"?>
+<p:sld xmlns:a="http://schemas.openxmlformats.org/drawingml/2006/main" xmlns:r="http://schemas.openxmlformats.org/officeDocument/2006/relationships" xmlns:p="http://schemas.openxmlformats.org/presentationml/2006/main">
+  <p:cSld>
+    <p:spTree>
+      <p:nvGrpSpPr>
+        <p:cNvPr id="1" name=""/>
+        <p:cNvGrpSpPr/>
+        <p:nvPr/>
+      </p:nvGrpSpPr>
+      <p:grpSpPr>
+        <a:xfrm>
+          <a:off x="0" y="0"/>
+          <a:ext cx="0" cy="0"/>
+          <a:chOff x="0" y="0"/>
+          <a:chExt cx="0" cy="0"/>
+        </a:xfrm>
+      </p:grpSpPr>
+      <p:sp>
+        <p:nvSpPr>
+          <p:cNvPr id="2" name="TextBox 1"/>
+          <p:cNvSpPr txBox="1"/>
+          <p:nvPr/>
+        </p:nvSpPr>
+        <p:spPr>
+          <a:xfrm>
+            <a:off x="179512" y="188640"/>
             <a:ext cx="8784976" cy="5770811"/>
           </a:xfrm>
           <a:prstGeom prst="rect">
@@ -4108,48 +4923,41 @@
                 <a:latin typeface="Segoe UI Light" pitchFamily="34" charset="0"/>
                 <a:cs typeface="Segoe UI Light" pitchFamily="34" charset="0"/>
               </a:rPr>
-              <a:t>та перегляду </a:t>
+              <a:t>та перегляду даних </a:t>
+            </a:r>
+            <a:r>
+              <a:rPr lang="uk-UA" dirty="0">
+                <a:latin typeface="Segoe UI Light" pitchFamily="34" charset="0"/>
+                <a:cs typeface="Segoe UI Light" pitchFamily="34" charset="0"/>
+              </a:rPr>
+              <a:t>про 3</a:t>
+            </a:r>
+            <a:r>
+              <a:rPr lang="en-US" dirty="0">
+                <a:latin typeface="Segoe UI Light" pitchFamily="34" charset="0"/>
+                <a:cs typeface="Segoe UI Light" pitchFamily="34" charset="0"/>
+              </a:rPr>
+              <a:t>D-</a:t>
             </a:r>
             <a:r>
               <a:rPr lang="uk-UA" dirty="0" smtClean="0">
                 <a:latin typeface="Segoe UI Light" pitchFamily="34" charset="0"/>
                 <a:cs typeface="Segoe UI Light" pitchFamily="34" charset="0"/>
               </a:rPr>
-              <a:t>даних </a:t>
+              <a:t>модель </a:t>
             </a:r>
             <a:r>
               <a:rPr lang="uk-UA" dirty="0">
                 <a:latin typeface="Segoe UI Light" pitchFamily="34" charset="0"/>
                 <a:cs typeface="Segoe UI Light" pitchFamily="34" charset="0"/>
               </a:rPr>
-              <a:t>про 3</a:t>
+              <a:t>можна вважати 3</a:t>
             </a:r>
             <a:r>
               <a:rPr lang="en-US" dirty="0">
                 <a:latin typeface="Segoe UI Light" pitchFamily="34" charset="0"/>
                 <a:cs typeface="Segoe UI Light" pitchFamily="34" charset="0"/>
               </a:rPr>
-              <a:t>D-</a:t>
-            </a:r>
-            <a:r>
-              <a:rPr lang="uk-UA" dirty="0" smtClean="0">
-                <a:latin typeface="Segoe UI Light" pitchFamily="34" charset="0"/>
-                <a:cs typeface="Segoe UI Light" pitchFamily="34" charset="0"/>
-              </a:rPr>
-              <a:t>модель </a:t>
-            </a:r>
-            <a:r>
-              <a:rPr lang="uk-UA" dirty="0">
-                <a:latin typeface="Segoe UI Light" pitchFamily="34" charset="0"/>
-                <a:cs typeface="Segoe UI Light" pitchFamily="34" charset="0"/>
-              </a:rPr>
-              <a:t>можна вважати 3</a:t>
-            </a:r>
-            <a:r>
-              <a:rPr lang="en-US" dirty="0">
-                <a:latin typeface="Segoe UI Light" pitchFamily="34" charset="0"/>
-                <a:cs typeface="Segoe UI Light" pitchFamily="34" charset="0"/>
-              </a:rPr>
               <a:t>D </a:t>
             </a:r>
             <a:r>
@@ -4157,14 +4965,7 @@
                 <a:latin typeface="Segoe UI Light" pitchFamily="34" charset="0"/>
                 <a:cs typeface="Segoe UI Light" pitchFamily="34" charset="0"/>
               </a:rPr>
-              <a:t>PDF</a:t>
-            </a:r>
-            <a:r>
-              <a:rPr lang="en-US" dirty="0" smtClean="0">
-                <a:latin typeface="Segoe UI Light" pitchFamily="34" charset="0"/>
-                <a:cs typeface="Segoe UI Light" pitchFamily="34" charset="0"/>
-              </a:rPr>
-              <a:t>.</a:t>
+              <a:t>PDF.</a:t>
             </a:r>
             <a:r>
               <a:rPr lang="uk-UA" dirty="0" smtClean="0">
@@ -4255,75 +5056,64 @@
                 <a:latin typeface="Segoe UI Light" pitchFamily="34" charset="0"/>
                 <a:cs typeface="Segoe UI Light" pitchFamily="34" charset="0"/>
               </a:rPr>
-              <a:t> надає достатній набір можливостей для цього. </a:t>
+              <a:t> надає достатній набір можливостей для цього. Зокрема, створений </a:t>
+            </a:r>
+            <a:r>
+              <a:rPr lang="en-US" dirty="0" smtClean="0">
+                <a:latin typeface="Segoe UI Light" pitchFamily="34" charset="0"/>
+                <a:cs typeface="Segoe UI Light" pitchFamily="34" charset="0"/>
+              </a:rPr>
+              <a:t>U3D</a:t>
             </a:r>
             <a:r>
               <a:rPr lang="uk-UA" dirty="0" smtClean="0">
                 <a:latin typeface="Segoe UI Light" pitchFamily="34" charset="0"/>
                 <a:cs typeface="Segoe UI Light" pitchFamily="34" charset="0"/>
               </a:rPr>
-              <a:t>Зокрема, створений </a:t>
+              <a:t> файл</a:t>
             </a:r>
             <a:r>
               <a:rPr lang="en-US" dirty="0" smtClean="0">
                 <a:latin typeface="Segoe UI Light" pitchFamily="34" charset="0"/>
                 <a:cs typeface="Segoe UI Light" pitchFamily="34" charset="0"/>
               </a:rPr>
-              <a:t>U3D</a:t>
+              <a:t> </a:t>
             </a:r>
             <a:r>
               <a:rPr lang="uk-UA" dirty="0" smtClean="0">
                 <a:latin typeface="Segoe UI Light" pitchFamily="34" charset="0"/>
                 <a:cs typeface="Segoe UI Light" pitchFamily="34" charset="0"/>
               </a:rPr>
-              <a:t> файл</a:t>
+              <a:t>можна швидко запакувати в </a:t>
             </a:r>
             <a:r>
               <a:rPr lang="en-US" dirty="0" smtClean="0">
                 <a:latin typeface="Segoe UI Light" pitchFamily="34" charset="0"/>
                 <a:cs typeface="Segoe UI Light" pitchFamily="34" charset="0"/>
               </a:rPr>
-              <a:t> </a:t>
+              <a:t>PDF</a:t>
             </a:r>
             <a:r>
               <a:rPr lang="uk-UA" dirty="0" smtClean="0">
                 <a:latin typeface="Segoe UI Light" pitchFamily="34" charset="0"/>
                 <a:cs typeface="Segoe UI Light" pitchFamily="34" charset="0"/>
               </a:rPr>
-              <a:t>можна швидко запакувати в </a:t>
+              <a:t> завдяки, використаним в розробленій бібліотеці, засобам пакету </a:t>
             </a:r>
             <a:r>
               <a:rPr lang="en-US" dirty="0" smtClean="0">
                 <a:latin typeface="Segoe UI Light" pitchFamily="34" charset="0"/>
                 <a:cs typeface="Segoe UI Light" pitchFamily="34" charset="0"/>
               </a:rPr>
-              <a:t>PDF</a:t>
+              <a:t>FreeSpire.PDF</a:t>
             </a:r>
             <a:r>
               <a:rPr lang="uk-UA" dirty="0" smtClean="0">
                 <a:latin typeface="Segoe UI Light" pitchFamily="34" charset="0"/>
                 <a:cs typeface="Segoe UI Light" pitchFamily="34" charset="0"/>
               </a:rPr>
-              <a:t> завдяки, використаним в розробленій бібліотеці, засобам пакету </a:t>
-            </a:r>
-            <a:r>
-              <a:rPr lang="en-US" dirty="0" smtClean="0">
-                <a:latin typeface="Segoe UI Light" pitchFamily="34" charset="0"/>
-                <a:cs typeface="Segoe UI Light" pitchFamily="34" charset="0"/>
-              </a:rPr>
-              <a:t>FreeSpire.PDF</a:t>
-            </a:r>
-            <a:r>
-              <a:rPr lang="uk-UA" dirty="0" smtClean="0">
-                <a:latin typeface="Segoe UI Light" pitchFamily="34" charset="0"/>
-                <a:cs typeface="Segoe UI Light" pitchFamily="34" charset="0"/>
-              </a:rPr>
               <a:t>. </a:t>
             </a:r>
-            <a:endParaRPr lang="uk-UA" dirty="0" smtClean="0">
-              <a:latin typeface="Segoe UI Light" pitchFamily="34" charset="0"/>
-              <a:cs typeface="Segoe UI Light" pitchFamily="34" charset="0"/>
-            </a:endParaRPr>
           </a:p>
         </p:txBody>
       </p:sp>
@@ -4347,7 +5137,7 @@
 </p:sld>
 </file>
 
-<file path=ppt/slides/slide5.xml><?xml version="1.0" encoding="utf-8"?>
+<file path=ppt/slides/slide9.xml><?xml version="1.0" encoding="utf-8"?>
 <p:sld xmlns:a="http://schemas.openxmlformats.org/drawingml/2006/main" xmlns:r="http://schemas.openxmlformats.org/officeDocument/2006/relationships" xmlns:p="http://schemas.openxmlformats.org/presentationml/2006/main">
   <p:cSld>
     <p:spTree>

</xml_diff>

<commit_message>
Presentation: changed slide about file format
</commit_message>
<xml_diff>
--- a/CourseProject/Presentation/U3DSpace.pptx
+++ b/CourseProject/Presentation/U3DSpace.pptx
@@ -4159,14 +4159,21 @@
                 <a:latin typeface="Segoe UI Light" pitchFamily="34" charset="0"/>
                 <a:cs typeface="Segoe UI Light" pitchFamily="34" charset="0"/>
               </a:rPr>
-              <a:t>може вбудовуватися в </a:t>
+              <a:t>підтримує </a:t>
+            </a:r>
+            <a:r>
+              <a:rPr lang="uk-UA" i="1" dirty="0">
+                <a:latin typeface="Segoe UI Light" pitchFamily="34" charset="0"/>
+                <a:cs typeface="Segoe UI Light" pitchFamily="34" charset="0"/>
+              </a:rPr>
+              <a:t>збереження у стисненому форматі</a:t>
             </a:r>
             <a:r>
               <a:rPr lang="en-US" i="1" dirty="0" smtClean="0">
                 <a:latin typeface="Segoe UI Light" pitchFamily="34" charset="0"/>
                 <a:cs typeface="Segoe UI Light" pitchFamily="34" charset="0"/>
               </a:rPr>
-              <a:t>PDF (3D PDF);</a:t>
+              <a:t>;</a:t>
             </a:r>
           </a:p>
           <a:p>
@@ -4178,19 +4185,51 @@
               <a:buChar char="•"/>
             </a:pPr>
             <a:r>
-              <a:rPr lang="uk-UA" i="1" dirty="0">
-                <a:latin typeface="Segoe UI Light" pitchFamily="34" charset="0"/>
-                <a:cs typeface="Segoe UI Light" pitchFamily="34" charset="0"/>
-              </a:rPr>
-              <a:t>підтримує збереження у стисненому форматі</a:t>
+              <a:rPr lang="uk-UA" i="1" dirty="0" smtClean="0">
+                <a:latin typeface="Segoe UI Light" pitchFamily="34" charset="0"/>
+                <a:cs typeface="Segoe UI Light" pitchFamily="34" charset="0"/>
+              </a:rPr>
+              <a:t>підтримує всі необхідні компоненти для сучасного представлення     </a:t>
             </a:r>
             <a:r>
               <a:rPr lang="en-US" i="1" dirty="0" smtClean="0">
                 <a:latin typeface="Segoe UI Light" pitchFamily="34" charset="0"/>
                 <a:cs typeface="Segoe UI Light" pitchFamily="34" charset="0"/>
               </a:rPr>
+              <a:t>3D-</a:t>
+            </a:r>
+            <a:r>
+              <a:rPr lang="uk-UA" i="1" dirty="0" smtClean="0">
+                <a:latin typeface="Segoe UI Light" pitchFamily="34" charset="0"/>
+                <a:cs typeface="Segoe UI Light" pitchFamily="34" charset="0"/>
+              </a:rPr>
+              <a:t>об</a:t>
+            </a:r>
+            <a:r>
+              <a:rPr lang="en-US" i="1" dirty="0" smtClean="0">
+                <a:latin typeface="Segoe UI Light" pitchFamily="34" charset="0"/>
+                <a:cs typeface="Segoe UI Light" pitchFamily="34" charset="0"/>
+              </a:rPr>
+              <a:t>’</a:t>
+            </a:r>
+            <a:r>
+              <a:rPr lang="uk-UA" i="1" dirty="0" err="1" smtClean="0">
+                <a:latin typeface="Segoe UI Light" pitchFamily="34" charset="0"/>
+                <a:cs typeface="Segoe UI Light" pitchFamily="34" charset="0"/>
+              </a:rPr>
+              <a:t>єктів</a:t>
+            </a:r>
+            <a:r>
+              <a:rPr lang="en-US" i="1" dirty="0" smtClean="0">
+                <a:latin typeface="Segoe UI Light" pitchFamily="34" charset="0"/>
+                <a:cs typeface="Segoe UI Light" pitchFamily="34" charset="0"/>
+              </a:rPr>
               <a:t>;</a:t>
             </a:r>
+            <a:endParaRPr lang="uk-UA" i="1" dirty="0" smtClean="0">
+              <a:latin typeface="Segoe UI Light" pitchFamily="34" charset="0"/>
+              <a:cs typeface="Segoe UI Light" pitchFamily="34" charset="0"/>
+            </a:endParaRPr>
           </a:p>
           <a:p>
             <a:pPr marL="1200150" lvl="2" indent="-285750" algn="just">
@@ -4205,83 +4244,98 @@
                 <a:latin typeface="Segoe UI Light" pitchFamily="34" charset="0"/>
                 <a:cs typeface="Segoe UI Light" pitchFamily="34" charset="0"/>
               </a:rPr>
-              <a:t>підтримує всі необхідні компоненти для сучасного представлення     </a:t>
+              <a:t>може бути</a:t>
             </a:r>
             <a:r>
               <a:rPr lang="en-US" i="1" dirty="0" smtClean="0">
                 <a:latin typeface="Segoe UI Light" pitchFamily="34" charset="0"/>
                 <a:cs typeface="Segoe UI Light" pitchFamily="34" charset="0"/>
               </a:rPr>
-              <a:t>3D-</a:t>
+              <a:t> </a:t>
             </a:r>
             <a:r>
               <a:rPr lang="uk-UA" i="1" dirty="0" smtClean="0">
                 <a:latin typeface="Segoe UI Light" pitchFamily="34" charset="0"/>
                 <a:cs typeface="Segoe UI Light" pitchFamily="34" charset="0"/>
               </a:rPr>
-              <a:t>об</a:t>
+              <a:t>легко переглянутий, наприклад в безкоштовній  популярній програмі </a:t>
+            </a:r>
+            <a:r>
+              <a:rPr lang="en-US" b="1" i="1" dirty="0" smtClean="0">
+                <a:latin typeface="Segoe UI Light" pitchFamily="34" charset="0"/>
+                <a:cs typeface="Segoe UI Light" pitchFamily="34" charset="0"/>
+              </a:rPr>
+              <a:t>Adobe Acrobat Reader</a:t>
+            </a:r>
+            <a:r>
+              <a:rPr lang="uk-UA" i="1" dirty="0">
+                <a:latin typeface="Segoe UI Light" pitchFamily="34" charset="0"/>
+                <a:cs typeface="Segoe UI Light" pitchFamily="34" charset="0"/>
+              </a:rPr>
+              <a:t> </a:t>
+            </a:r>
+            <a:r>
+              <a:rPr lang="uk-UA" i="1" dirty="0" smtClean="0">
+                <a:latin typeface="Segoe UI Light" pitchFamily="34" charset="0"/>
+                <a:cs typeface="Segoe UI Light" pitchFamily="34" charset="0"/>
+              </a:rPr>
+              <a:t>(після </a:t>
+            </a:r>
+            <a:r>
+              <a:rPr lang="uk-UA" i="1" dirty="0">
+                <a:latin typeface="Segoe UI Light" pitchFamily="34" charset="0"/>
+                <a:cs typeface="Segoe UI Light" pitchFamily="34" charset="0"/>
+              </a:rPr>
+              <a:t>запакування в </a:t>
             </a:r>
             <a:r>
               <a:rPr lang="en-US" i="1" dirty="0" smtClean="0">
                 <a:latin typeface="Segoe UI Light" pitchFamily="34" charset="0"/>
                 <a:cs typeface="Segoe UI Light" pitchFamily="34" charset="0"/>
               </a:rPr>
-              <a:t>’</a:t>
-            </a:r>
-            <a:r>
-              <a:rPr lang="uk-UA" i="1" dirty="0" err="1" smtClean="0">
-                <a:latin typeface="Segoe UI Light" pitchFamily="34" charset="0"/>
-                <a:cs typeface="Segoe UI Light" pitchFamily="34" charset="0"/>
-              </a:rPr>
-              <a:t>єктів</a:t>
+              <a:t>PDF</a:t>
+            </a:r>
+            <a:r>
+              <a:rPr lang="uk-UA" i="1" smtClean="0">
+                <a:latin typeface="Segoe UI Light" pitchFamily="34" charset="0"/>
+                <a:cs typeface="Segoe UI Light" pitchFamily="34" charset="0"/>
+              </a:rPr>
+              <a:t>), або </a:t>
+            </a:r>
+            <a:r>
+              <a:rPr lang="uk-UA" i="1" dirty="0" smtClean="0">
+                <a:latin typeface="Segoe UI Light" pitchFamily="34" charset="0"/>
+                <a:cs typeface="Segoe UI Light" pitchFamily="34" charset="0"/>
+              </a:rPr>
+              <a:t>переглядачами </a:t>
+            </a:r>
+            <a:r>
+              <a:rPr lang="en-US" b="1" i="1" dirty="0" smtClean="0">
+                <a:latin typeface="Segoe UI Light" pitchFamily="34" charset="0"/>
+                <a:cs typeface="Segoe UI Light" pitchFamily="34" charset="0"/>
+              </a:rPr>
+              <a:t>SAP 3D Visual Enterprise Viewer</a:t>
             </a:r>
             <a:r>
               <a:rPr lang="en-US" i="1" dirty="0" smtClean="0">
                 <a:latin typeface="Segoe UI Light" pitchFamily="34" charset="0"/>
                 <a:cs typeface="Segoe UI Light" pitchFamily="34" charset="0"/>
               </a:rPr>
-              <a:t>;</a:t>
-            </a:r>
-            <a:endParaRPr lang="uk-UA" i="1" dirty="0" smtClean="0">
-              <a:latin typeface="Segoe UI Light" pitchFamily="34" charset="0"/>
-              <a:cs typeface="Segoe UI Light" pitchFamily="34" charset="0"/>
-            </a:endParaRPr>
-          </a:p>
-          <a:p>
-            <a:pPr marL="1200150" lvl="2" indent="-285750" algn="just">
-              <a:lnSpc>
-                <a:spcPct val="150000"/>
-              </a:lnSpc>
-              <a:buFont typeface="Arial" pitchFamily="34" charset="0"/>
-              <a:buChar char="•"/>
-            </a:pPr>
+              <a:t> </a:t>
+            </a:r>
             <a:r>
               <a:rPr lang="uk-UA" i="1" dirty="0" smtClean="0">
                 <a:latin typeface="Segoe UI Light" pitchFamily="34" charset="0"/>
                 <a:cs typeface="Segoe UI Light" pitchFamily="34" charset="0"/>
               </a:rPr>
-              <a:t>після запакування в </a:t>
-            </a:r>
-            <a:r>
-              <a:rPr lang="en-US" i="1" dirty="0" smtClean="0">
-                <a:latin typeface="Segoe UI Light" pitchFamily="34" charset="0"/>
-                <a:cs typeface="Segoe UI Light" pitchFamily="34" charset="0"/>
-              </a:rPr>
-              <a:t>PDF</a:t>
-            </a:r>
-            <a:r>
-              <a:rPr lang="uk-UA" i="1" dirty="0" smtClean="0">
-                <a:latin typeface="Segoe UI Light" pitchFamily="34" charset="0"/>
-                <a:cs typeface="Segoe UI Light" pitchFamily="34" charset="0"/>
-              </a:rPr>
-              <a:t>, може бути переглянутий в безкоштовній  популярній програмі </a:t>
-            </a:r>
-            <a:r>
-              <a:rPr lang="en-US" i="1" dirty="0" smtClean="0">
-                <a:latin typeface="Segoe UI Light" pitchFamily="34" charset="0"/>
-                <a:cs typeface="Segoe UI Light" pitchFamily="34" charset="0"/>
-              </a:rPr>
-              <a:t>Adobe Acrobat Reader</a:t>
+              <a:t>чи </a:t>
+            </a:r>
+            <a:r>
+              <a:rPr lang="en-US" b="1" i="1" dirty="0" smtClean="0">
+                <a:latin typeface="Segoe UI Light" pitchFamily="34" charset="0"/>
+                <a:cs typeface="Segoe UI Light" pitchFamily="34" charset="0"/>
+              </a:rPr>
+              <a:t>Tetra4D Reviewer</a:t>
             </a:r>
             <a:r>
               <a:rPr lang="uk-UA" i="1" dirty="0" smtClean="0">

</xml_diff>

<commit_message>
Presentation: finished slide "Structure of library"
</commit_message>
<xml_diff>
--- a/CourseProject/Presentation/U3DSpace.pptx
+++ b/CourseProject/Presentation/U3DSpace.pptx
@@ -3950,7 +3950,21 @@
                 <a:latin typeface="Segoe UI Light" pitchFamily="34" charset="0"/>
                 <a:cs typeface="Segoe UI Light" pitchFamily="34" charset="0"/>
               </a:rPr>
-              <a:t>Про обраний формат</a:t>
+              <a:t>Про </a:t>
+            </a:r>
+            <a:r>
+              <a:rPr lang="uk-UA" b="1" dirty="0" smtClean="0">
+                <a:latin typeface="Segoe UI Light" pitchFamily="34" charset="0"/>
+                <a:cs typeface="Segoe UI Light" pitchFamily="34" charset="0"/>
+              </a:rPr>
+              <a:t>формат </a:t>
+            </a:r>
+            <a:r>
+              <a:rPr lang="en-US" b="1" dirty="0" smtClean="0">
+                <a:latin typeface="Segoe UI Light" pitchFamily="34" charset="0"/>
+                <a:cs typeface="Segoe UI Light" pitchFamily="34" charset="0"/>
+              </a:rPr>
+              <a:t>Universal 3D</a:t>
             </a:r>
             <a:endParaRPr lang="uk-UA" b="1" dirty="0" smtClean="0">
               <a:latin typeface="Segoe UI Light" pitchFamily="34" charset="0"/>
@@ -4296,18 +4310,11 @@
               <a:t>PDF</a:t>
             </a:r>
             <a:r>
-              <a:rPr lang="uk-UA" i="1" smtClean="0">
-                <a:latin typeface="Segoe UI Light" pitchFamily="34" charset="0"/>
-                <a:cs typeface="Segoe UI Light" pitchFamily="34" charset="0"/>
-              </a:rPr>
-              <a:t>), або </a:t>
-            </a:r>
-            <a:r>
               <a:rPr lang="uk-UA" i="1" dirty="0" smtClean="0">
                 <a:latin typeface="Segoe UI Light" pitchFamily="34" charset="0"/>
                 <a:cs typeface="Segoe UI Light" pitchFamily="34" charset="0"/>
               </a:rPr>
-              <a:t>переглядачами </a:t>
+              <a:t>), або переглядачами </a:t>
             </a:r>
             <a:r>
               <a:rPr lang="en-US" b="1" i="1" dirty="0" smtClean="0">
@@ -4397,7 +4404,7 @@
         <p:spPr>
           <a:xfrm>
             <a:off x="179512" y="188640"/>
-            <a:ext cx="8784976" cy="1477328"/>
+            <a:ext cx="8784976" cy="923330"/>
           </a:xfrm>
           <a:prstGeom prst="rect">
             <a:avLst/>
@@ -4428,34 +4435,248 @@
           </a:p>
           <a:p>
             <a:pPr algn="ctr"/>
-            <a:endParaRPr lang="uk-UA" dirty="0" smtClean="0">
-              <a:latin typeface="Segoe UI Light" pitchFamily="34" charset="0"/>
-              <a:cs typeface="Segoe UI Light" pitchFamily="34" charset="0"/>
-            </a:endParaRPr>
-          </a:p>
-          <a:p>
-            <a:pPr algn="ctr"/>
             <a:endParaRPr lang="uk-UA" dirty="0">
               <a:latin typeface="Segoe UI Light" pitchFamily="34" charset="0"/>
               <a:cs typeface="Segoe UI Light" pitchFamily="34" charset="0"/>
             </a:endParaRPr>
           </a:p>
-          <a:p>
-            <a:pPr algn="ctr"/>
-            <a:r>
-              <a:rPr lang="uk-UA" dirty="0" smtClean="0">
-                <a:latin typeface="Segoe UI Light" pitchFamily="34" charset="0"/>
-                <a:cs typeface="Segoe UI Light" pitchFamily="34" charset="0"/>
-              </a:rPr>
-              <a:t>текст</a:t>
-            </a:r>
-            <a:endParaRPr lang="uk-UA" dirty="0" smtClean="0">
-              <a:latin typeface="Segoe UI Light" pitchFamily="34" charset="0"/>
-              <a:cs typeface="Segoe UI Light" pitchFamily="34" charset="0"/>
-            </a:endParaRPr>
-          </a:p>
-        </p:txBody>
-      </p:sp>
+        </p:txBody>
+      </p:sp>
+      <p:grpSp>
+        <p:nvGrpSpPr>
+          <p:cNvPr id="3" name="Групувати 2"/>
+          <p:cNvGrpSpPr/>
+          <p:nvPr/>
+        </p:nvGrpSpPr>
+        <p:grpSpPr>
+          <a:xfrm>
+            <a:off x="683568" y="617783"/>
+            <a:ext cx="2761481" cy="6200775"/>
+            <a:chOff x="3203848" y="641177"/>
+            <a:chExt cx="2761481" cy="6200775"/>
+          </a:xfrm>
+        </p:grpSpPr>
+        <p:pic>
+          <p:nvPicPr>
+            <p:cNvPr id="1026" name="Picture 2"/>
+            <p:cNvPicPr>
+              <a:picLocks noChangeAspect="1" noChangeArrowheads="1"/>
+            </p:cNvPicPr>
+            <p:nvPr/>
+          </p:nvPicPr>
+          <p:blipFill>
+            <a:blip r:embed="rId2">
+              <a:extLst>
+                <a:ext uri="{28A0092B-C50C-407E-A947-70E740481C1C}">
+                  <a14:useLocalDpi xmlns:a14="http://schemas.microsoft.com/office/drawing/2010/main" val="0"/>
+                </a:ext>
+              </a:extLst>
+            </a:blip>
+            <a:srcRect/>
+            <a:stretch>
+              <a:fillRect/>
+            </a:stretch>
+          </p:blipFill>
+          <p:spPr bwMode="auto">
+            <a:xfrm>
+              <a:off x="3203848" y="641177"/>
+              <a:ext cx="2752725" cy="4286250"/>
+            </a:xfrm>
+            <a:prstGeom prst="rect">
+              <a:avLst/>
+            </a:prstGeom>
+            <a:noFill/>
+            <a:ln>
+              <a:noFill/>
+            </a:ln>
+            <a:effectLst/>
+            <a:extLst>
+              <a:ext uri="{909E8E84-426E-40DD-AFC4-6F175D3DCCD1}">
+                <a14:hiddenFill xmlns:a14="http://schemas.microsoft.com/office/drawing/2010/main">
+                  <a:solidFill>
+                    <a:schemeClr val="accent1"/>
+                  </a:solidFill>
+                </a14:hiddenFill>
+              </a:ext>
+              <a:ext uri="{91240B29-F687-4F45-9708-019B960494DF}">
+                <a14:hiddenLine xmlns:a14="http://schemas.microsoft.com/office/drawing/2010/main" w="9525">
+                  <a:solidFill>
+                    <a:schemeClr val="tx1"/>
+                  </a:solidFill>
+                  <a:miter lim="800000"/>
+                  <a:headEnd/>
+                  <a:tailEnd/>
+                </a14:hiddenLine>
+              </a:ext>
+              <a:ext uri="{AF507438-7753-43E0-B8FC-AC1667EBCBE1}">
+                <a14:hiddenEffects xmlns:a14="http://schemas.microsoft.com/office/drawing/2010/main">
+                  <a:effectLst>
+                    <a:outerShdw dist="35921" dir="2700000" algn="ctr" rotWithShape="0">
+                      <a:schemeClr val="bg2"/>
+                    </a:outerShdw>
+                  </a:effectLst>
+                </a14:hiddenEffects>
+              </a:ext>
+            </a:extLst>
+          </p:spPr>
+        </p:pic>
+        <p:pic>
+          <p:nvPicPr>
+            <p:cNvPr id="1027" name="Picture 3"/>
+            <p:cNvPicPr>
+              <a:picLocks noChangeAspect="1" noChangeArrowheads="1"/>
+            </p:cNvPicPr>
+            <p:nvPr/>
+          </p:nvPicPr>
+          <p:blipFill>
+            <a:blip r:embed="rId3">
+              <a:extLst>
+                <a:ext uri="{28A0092B-C50C-407E-A947-70E740481C1C}">
+                  <a14:useLocalDpi xmlns:a14="http://schemas.microsoft.com/office/drawing/2010/main" val="0"/>
+                </a:ext>
+              </a:extLst>
+            </a:blip>
+            <a:srcRect/>
+            <a:stretch>
+              <a:fillRect/>
+            </a:stretch>
+          </p:blipFill>
+          <p:spPr bwMode="auto">
+            <a:xfrm>
+              <a:off x="3222129" y="4927427"/>
+              <a:ext cx="2743200" cy="1914525"/>
+            </a:xfrm>
+            <a:prstGeom prst="rect">
+              <a:avLst/>
+            </a:prstGeom>
+            <a:noFill/>
+            <a:ln>
+              <a:noFill/>
+            </a:ln>
+            <a:effectLst/>
+            <a:extLst>
+              <a:ext uri="{909E8E84-426E-40DD-AFC4-6F175D3DCCD1}">
+                <a14:hiddenFill xmlns:a14="http://schemas.microsoft.com/office/drawing/2010/main">
+                  <a:solidFill>
+                    <a:schemeClr val="accent1"/>
+                  </a:solidFill>
+                </a14:hiddenFill>
+              </a:ext>
+              <a:ext uri="{91240B29-F687-4F45-9708-019B960494DF}">
+                <a14:hiddenLine xmlns:a14="http://schemas.microsoft.com/office/drawing/2010/main" w="9525">
+                  <a:solidFill>
+                    <a:schemeClr val="tx1"/>
+                  </a:solidFill>
+                  <a:miter lim="800000"/>
+                  <a:headEnd/>
+                  <a:tailEnd/>
+                </a14:hiddenLine>
+              </a:ext>
+              <a:ext uri="{AF507438-7753-43E0-B8FC-AC1667EBCBE1}">
+                <a14:hiddenEffects xmlns:a14="http://schemas.microsoft.com/office/drawing/2010/main">
+                  <a:effectLst>
+                    <a:outerShdw dist="35921" dir="2700000" algn="ctr" rotWithShape="0">
+                      <a:schemeClr val="bg2"/>
+                    </a:outerShdw>
+                  </a:effectLst>
+                </a14:hiddenEffects>
+              </a:ext>
+            </a:extLst>
+          </p:spPr>
+        </p:pic>
+      </p:grpSp>
+      <p:pic>
+        <p:nvPicPr>
+          <p:cNvPr id="1030" name="Picture 6"/>
+          <p:cNvPicPr>
+            <a:picLocks noChangeAspect="1" noChangeArrowheads="1"/>
+          </p:cNvPicPr>
+          <p:nvPr/>
+        </p:nvPicPr>
+        <p:blipFill>
+          <a:blip r:embed="rId4">
+            <a:extLst>
+              <a:ext uri="{28A0092B-C50C-407E-A947-70E740481C1C}">
+                <a14:useLocalDpi xmlns:a14="http://schemas.microsoft.com/office/drawing/2010/main" val="0"/>
+              </a:ext>
+            </a:extLst>
+          </a:blip>
+          <a:srcRect/>
+          <a:stretch>
+            <a:fillRect/>
+          </a:stretch>
+        </p:blipFill>
+        <p:spPr bwMode="auto">
+          <a:xfrm>
+            <a:off x="3739912" y="1111970"/>
+            <a:ext cx="5210175" cy="4448175"/>
+          </a:xfrm>
+          <a:prstGeom prst="rect">
+            <a:avLst/>
+          </a:prstGeom>
+          <a:noFill/>
+          <a:ln w="9525">
+            <a:solidFill>
+              <a:schemeClr val="tx1"/>
+            </a:solidFill>
+            <a:miter lim="800000"/>
+            <a:headEnd/>
+            <a:tailEnd/>
+          </a:ln>
+          <a:effectLst/>
+          <a:extLst>
+            <a:ext uri="{909E8E84-426E-40DD-AFC4-6F175D3DCCD1}">
+              <a14:hiddenFill xmlns:a14="http://schemas.microsoft.com/office/drawing/2010/main">
+                <a:solidFill>
+                  <a:schemeClr val="accent1"/>
+                </a:solidFill>
+              </a14:hiddenFill>
+            </a:ext>
+            <a:ext uri="{AF507438-7753-43E0-B8FC-AC1667EBCBE1}">
+              <a14:hiddenEffects xmlns:a14="http://schemas.microsoft.com/office/drawing/2010/main">
+                <a:effectLst>
+                  <a:outerShdw dist="35921" dir="2700000" algn="ctr" rotWithShape="0">
+                    <a:schemeClr val="bg2"/>
+                  </a:outerShdw>
+                </a:effectLst>
+              </a14:hiddenEffects>
+            </a:ext>
+          </a:extLst>
+        </p:spPr>
+      </p:pic>
+      <p:cxnSp>
+        <p:nvCxnSpPr>
+          <p:cNvPr id="5" name="Пряма зі стрілкою 4"/>
+          <p:cNvCxnSpPr/>
+          <p:nvPr/>
+        </p:nvCxnSpPr>
+        <p:spPr>
+          <a:xfrm flipV="1">
+            <a:off x="2267744" y="5661248"/>
+            <a:ext cx="1872208" cy="1008112"/>
+          </a:xfrm>
+          <a:prstGeom prst="straightConnector1">
+            <a:avLst/>
+          </a:prstGeom>
+          <a:ln>
+            <a:tailEnd type="arrow"/>
+          </a:ln>
+        </p:spPr>
+        <p:style>
+          <a:lnRef idx="1">
+            <a:schemeClr val="accent1"/>
+          </a:lnRef>
+          <a:fillRef idx="0">
+            <a:schemeClr val="accent1"/>
+          </a:fillRef>
+          <a:effectRef idx="0">
+            <a:schemeClr val="accent1"/>
+          </a:effectRef>
+          <a:fontRef idx="minor">
+            <a:schemeClr val="tx1"/>
+          </a:fontRef>
+        </p:style>
+      </p:cxnSp>
     </p:spTree>
     <p:extLst>
       <p:ext uri="{BB962C8B-B14F-4D97-AF65-F5344CB8AC3E}">

</xml_diff>